<commit_message>
Updated analysis schema and source file
</commit_message>
<xml_diff>
--- a/nhs/analysis/NHS proposed analysis - v2019-05-11.pptx
+++ b/nhs/analysis/NHS proposed analysis - v2019-05-11.pptx
@@ -3814,11 +3814,17 @@
         <p:spPr>
           <a:xfrm>
             <a:off x="3969834" y="97917"/>
-            <a:ext cx="4170555" cy="1374044"/>
+            <a:ext cx="4170555" cy="1663976"/>
           </a:xfrm>
           <a:prstGeom prst="rect">
             <a:avLst/>
           </a:prstGeom>
+          <a:solidFill>
+            <a:schemeClr val="accent1">
+              <a:lumMod val="60000"/>
+              <a:lumOff val="40000"/>
+            </a:schemeClr>
+          </a:solidFill>
         </p:spPr>
         <p:style>
           <a:lnRef idx="2">
@@ -3842,6 +3848,17 @@
           <a:p>
             <a:pPr algn="ctr"/>
             <a:r>
+              <a:rPr lang="en-US" sz="2400" b="1" dirty="0">
+                <a:solidFill>
+                  <a:schemeClr val="bg1"/>
+                </a:solidFill>
+              </a:rPr>
+              <a:t>Dependent variables:</a:t>
+            </a:r>
+          </a:p>
+          <a:p>
+            <a:pPr algn="ctr"/>
+            <a:r>
               <a:rPr lang="en-US" dirty="0">
                 <a:solidFill>
                   <a:schemeClr val="bg1"/>
@@ -3855,9 +3872,7 @@
             <a:r>
               <a:rPr lang="en-US" dirty="0">
                 <a:solidFill>
-                  <a:schemeClr val="bg1">
-                    <a:lumMod val="50000"/>
-                  </a:schemeClr>
+                  <a:srgbClr val="FF0000"/>
                 </a:solidFill>
               </a:rPr>
               <a:t>NHS CQC rating</a:t>
@@ -3868,9 +3883,7 @@
             <a:r>
               <a:rPr lang="en-US" dirty="0">
                 <a:solidFill>
-                  <a:schemeClr val="bg1">
-                    <a:lumMod val="50000"/>
-                  </a:schemeClr>
+                  <a:srgbClr val="FF0000"/>
                 </a:solidFill>
               </a:rPr>
               <a:t>Patient sat</a:t>
@@ -3881,9 +3894,7 @@
             <a:r>
               <a:rPr lang="en-US" dirty="0">
                 <a:solidFill>
-                  <a:schemeClr val="bg1">
-                    <a:lumMod val="50000"/>
-                  </a:schemeClr>
+                  <a:srgbClr val="FF0000"/>
                 </a:solidFill>
               </a:rPr>
               <a:t>Staff recommendation for family/friends </a:t>
@@ -3897,7 +3908,7 @@
                   <a:schemeClr val="bg1"/>
                 </a:solidFill>
               </a:rPr>
-              <a:t>(index year 0 – </a:t>
+              <a:t>(index year 0: </a:t>
             </a:r>
             <a:r>
               <a:rPr lang="en-US" b="1" dirty="0">
@@ -3936,8 +3947,8 @@
         </p:nvCxnSpPr>
         <p:spPr>
           <a:xfrm>
-            <a:off x="8140389" y="784939"/>
-            <a:ext cx="1318247" cy="0"/>
+            <a:off x="8140389" y="929905"/>
+            <a:ext cx="1683835" cy="0"/>
           </a:xfrm>
           <a:prstGeom prst="straightConnector1">
             <a:avLst/>
@@ -3975,12 +3986,18 @@
         </p:nvSpPr>
         <p:spPr>
           <a:xfrm>
-            <a:off x="9458636" y="263829"/>
-            <a:ext cx="2361657" cy="1042219"/>
+            <a:off x="9824224" y="408795"/>
+            <a:ext cx="1996069" cy="1042219"/>
           </a:xfrm>
           <a:prstGeom prst="rect">
             <a:avLst/>
           </a:prstGeom>
+          <a:solidFill>
+            <a:schemeClr val="accent1">
+              <a:lumMod val="60000"/>
+              <a:lumOff val="40000"/>
+            </a:schemeClr>
+          </a:solidFill>
         </p:spPr>
         <p:style>
           <a:lnRef idx="2">
@@ -4012,7 +4029,7 @@
             <a:pPr algn="ctr"/>
             <a:r>
               <a:rPr lang="en-US" dirty="0"/>
-              <a:t>(year +1)</a:t>
+              <a:t>(year +1: 2018)</a:t>
             </a:r>
           </a:p>
         </p:txBody>
@@ -4035,8 +4052,8 @@
         </p:nvCxnSpPr>
         <p:spPr>
           <a:xfrm>
-            <a:off x="2139197" y="781138"/>
-            <a:ext cx="1830637" cy="3801"/>
+            <a:off x="2125672" y="929905"/>
+            <a:ext cx="1844162" cy="0"/>
           </a:xfrm>
           <a:prstGeom prst="straightConnector1">
             <a:avLst/>
@@ -4076,7 +4093,7 @@
         </p:nvCxnSpPr>
         <p:spPr>
           <a:xfrm>
-            <a:off x="5494079" y="1471961"/>
+            <a:off x="5494079" y="1750740"/>
             <a:ext cx="0" cy="2289071"/>
           </a:xfrm>
           <a:prstGeom prst="straightConnector1">
@@ -4116,7 +4133,7 @@
         </p:nvSpPr>
         <p:spPr>
           <a:xfrm>
-            <a:off x="2174226" y="900952"/>
+            <a:off x="2154618" y="956461"/>
             <a:ext cx="2047684" cy="3693319"/>
           </a:xfrm>
           <a:prstGeom prst="rect">
@@ -4164,9 +4181,7 @@
             <a:r>
               <a:rPr lang="en-US" dirty="0">
                 <a:solidFill>
-                  <a:schemeClr val="bg1">
-                    <a:lumMod val="50000"/>
-                  </a:schemeClr>
+                  <a:srgbClr val="FF0000"/>
                 </a:solidFill>
               </a:rPr>
               <a:t>(or CQC, staff rec, or patient sat according to dependent variable)</a:t>
@@ -4238,12 +4253,18 @@
         </p:nvSpPr>
         <p:spPr>
           <a:xfrm>
-            <a:off x="91513" y="260028"/>
+            <a:off x="77988" y="408795"/>
             <a:ext cx="2047684" cy="1042219"/>
           </a:xfrm>
           <a:prstGeom prst="rect">
             <a:avLst/>
           </a:prstGeom>
+          <a:solidFill>
+            <a:schemeClr val="accent1">
+              <a:lumMod val="60000"/>
+              <a:lumOff val="40000"/>
+            </a:schemeClr>
+          </a:solidFill>
         </p:spPr>
         <p:style>
           <a:lnRef idx="2">
@@ -4275,7 +4296,7 @@
             <a:pPr algn="ctr"/>
             <a:r>
               <a:rPr lang="en-US" dirty="0"/>
-              <a:t>(year -1)</a:t>
+              <a:t>(year -1: 2016)</a:t>
             </a:r>
           </a:p>
         </p:txBody>
@@ -4294,12 +4315,18 @@
         </p:nvSpPr>
         <p:spPr>
           <a:xfrm>
-            <a:off x="4632894" y="3761032"/>
-            <a:ext cx="3038213" cy="1042219"/>
+            <a:off x="4632894" y="4039812"/>
+            <a:ext cx="3038213" cy="889028"/>
           </a:xfrm>
           <a:prstGeom prst="rect">
             <a:avLst/>
           </a:prstGeom>
+          <a:solidFill>
+            <a:schemeClr val="accent1">
+              <a:lumMod val="60000"/>
+              <a:lumOff val="40000"/>
+            </a:schemeClr>
+          </a:solidFill>
         </p:spPr>
         <p:style>
           <a:lnRef idx="2">
@@ -4365,6 +4392,10 @@
           <a:lstStyle/>
           <a:p>
             <a:r>
+              <a:rPr lang="en-US" b="1" dirty="0"/>
+              <a:t>Lagged regression analysis: </a:t>
+            </a:r>
+            <a:r>
               <a:rPr lang="en-US" dirty="0"/>
               <a:t>After calculating </a:t>
             </a:r>
@@ -4452,7 +4483,7 @@
         </p:nvSpPr>
         <p:spPr>
           <a:xfrm>
-            <a:off x="5529109" y="1524646"/>
+            <a:off x="5529109" y="1803425"/>
             <a:ext cx="1885213" cy="2400657"/>
           </a:xfrm>
           <a:prstGeom prst="rect">
@@ -4551,7 +4582,7 @@
         </p:nvSpPr>
         <p:spPr>
           <a:xfrm>
-            <a:off x="8242309" y="1019915"/>
+            <a:off x="8175418" y="956461"/>
             <a:ext cx="2448225" cy="2031325"/>
           </a:xfrm>
           <a:prstGeom prst="rect">

</xml_diff>